<commit_message>
Update all diagrams for Dev Guide
</commit_message>
<xml_diff>
--- a/docs/diagrams/AddSequenceDiagram.pptx
+++ b/docs/diagrams/AddSequenceDiagram.pptx
@@ -208,7 +208,7 @@
           <a:p>
             <a:fld id="{F5CC4B3F-88C1-4FFA-B1B6-F41C21DC6924}" type="datetimeFigureOut">
               <a:rPr lang="en-US" smtClean="0"/>
-              <a:t>10/17/18</a:t>
+              <a:t>11/11/18</a:t>
             </a:fld>
             <a:endParaRPr lang="en-US"/>
           </a:p>
@@ -738,7 +738,7 @@
           <a:p>
             <a:fld id="{78C97017-6FC3-485B-9764-EAC9E56C1D49}" type="datetimeFigureOut">
               <a:rPr lang="en-US" smtClean="0"/>
-              <a:t>10/17/18</a:t>
+              <a:t>11/11/18</a:t>
             </a:fld>
             <a:endParaRPr lang="en-US"/>
           </a:p>
@@ -906,7 +906,7 @@
           <a:p>
             <a:fld id="{78C97017-6FC3-485B-9764-EAC9E56C1D49}" type="datetimeFigureOut">
               <a:rPr lang="en-US" smtClean="0"/>
-              <a:t>10/17/18</a:t>
+              <a:t>11/11/18</a:t>
             </a:fld>
             <a:endParaRPr lang="en-US"/>
           </a:p>
@@ -1084,7 +1084,7 @@
           <a:p>
             <a:fld id="{78C97017-6FC3-485B-9764-EAC9E56C1D49}" type="datetimeFigureOut">
               <a:rPr lang="en-US" smtClean="0"/>
-              <a:t>10/17/18</a:t>
+              <a:t>11/11/18</a:t>
             </a:fld>
             <a:endParaRPr lang="en-US"/>
           </a:p>
@@ -1252,7 +1252,7 @@
           <a:p>
             <a:fld id="{78C97017-6FC3-485B-9764-EAC9E56C1D49}" type="datetimeFigureOut">
               <a:rPr lang="en-US" smtClean="0"/>
-              <a:t>10/17/18</a:t>
+              <a:t>11/11/18</a:t>
             </a:fld>
             <a:endParaRPr lang="en-US"/>
           </a:p>
@@ -1497,7 +1497,7 @@
           <a:p>
             <a:fld id="{78C97017-6FC3-485B-9764-EAC9E56C1D49}" type="datetimeFigureOut">
               <a:rPr lang="en-US" smtClean="0"/>
-              <a:t>10/17/18</a:t>
+              <a:t>11/11/18</a:t>
             </a:fld>
             <a:endParaRPr lang="en-US"/>
           </a:p>
@@ -1782,7 +1782,7 @@
           <a:p>
             <a:fld id="{78C97017-6FC3-485B-9764-EAC9E56C1D49}" type="datetimeFigureOut">
               <a:rPr lang="en-US" smtClean="0"/>
-              <a:t>10/17/18</a:t>
+              <a:t>11/11/18</a:t>
             </a:fld>
             <a:endParaRPr lang="en-US"/>
           </a:p>
@@ -2201,7 +2201,7 @@
           <a:p>
             <a:fld id="{78C97017-6FC3-485B-9764-EAC9E56C1D49}" type="datetimeFigureOut">
               <a:rPr lang="en-US" smtClean="0"/>
-              <a:t>10/17/18</a:t>
+              <a:t>11/11/18</a:t>
             </a:fld>
             <a:endParaRPr lang="en-US"/>
           </a:p>
@@ -2318,7 +2318,7 @@
           <a:p>
             <a:fld id="{78C97017-6FC3-485B-9764-EAC9E56C1D49}" type="datetimeFigureOut">
               <a:rPr lang="en-US" smtClean="0"/>
-              <a:t>10/17/18</a:t>
+              <a:t>11/11/18</a:t>
             </a:fld>
             <a:endParaRPr lang="en-US"/>
           </a:p>
@@ -2413,7 +2413,7 @@
           <a:p>
             <a:fld id="{78C97017-6FC3-485B-9764-EAC9E56C1D49}" type="datetimeFigureOut">
               <a:rPr lang="en-US" smtClean="0"/>
-              <a:t>10/17/18</a:t>
+              <a:t>11/11/18</a:t>
             </a:fld>
             <a:endParaRPr lang="en-US"/>
           </a:p>
@@ -2688,7 +2688,7 @@
           <a:p>
             <a:fld id="{78C97017-6FC3-485B-9764-EAC9E56C1D49}" type="datetimeFigureOut">
               <a:rPr lang="en-US" smtClean="0"/>
-              <a:t>10/17/18</a:t>
+              <a:t>11/11/18</a:t>
             </a:fld>
             <a:endParaRPr lang="en-US"/>
           </a:p>
@@ -2940,7 +2940,7 @@
           <a:p>
             <a:fld id="{78C97017-6FC3-485B-9764-EAC9E56C1D49}" type="datetimeFigureOut">
               <a:rPr lang="en-US" smtClean="0"/>
-              <a:t>10/17/18</a:t>
+              <a:t>11/11/18</a:t>
             </a:fld>
             <a:endParaRPr lang="en-US"/>
           </a:p>
@@ -3151,7 +3151,7 @@
           <a:p>
             <a:fld id="{78C97017-6FC3-485B-9764-EAC9E56C1D49}" type="datetimeFigureOut">
               <a:rPr lang="en-US" smtClean="0"/>
-              <a:t>10/17/18</a:t>
+              <a:t>11/11/18</a:t>
             </a:fld>
             <a:endParaRPr lang="en-US"/>
           </a:p>
@@ -3850,18 +3850,31 @@
                   <a:schemeClr val="bg1"/>
                 </a:solidFill>
               </a:rPr>
-              <a:t>:Address</a:t>
-            </a:r>
+              <a:t>:</a:t>
+            </a:r>
+            <a:r>
+              <a:rPr lang="en-US" sz="1600" dirty="0" err="1">
+                <a:solidFill>
+                  <a:schemeClr val="bg1"/>
+                </a:solidFill>
+              </a:rPr>
+              <a:t>Ssenisub</a:t>
+            </a:r>
+            <a:endParaRPr lang="en-US" sz="1600" dirty="0">
+              <a:solidFill>
+                <a:schemeClr val="bg1"/>
+              </a:solidFill>
+            </a:endParaRPr>
           </a:p>
           <a:p>
             <a:pPr algn="ctr"/>
             <a:r>
-              <a:rPr lang="en-US" sz="1600" dirty="0" err="1">
+              <a:rPr lang="en-US" sz="1600" dirty="0">
                 <a:solidFill>
                   <a:schemeClr val="bg1"/>
                 </a:solidFill>
               </a:rPr>
-              <a:t>BookParser</a:t>
+              <a:t>Parser</a:t>
             </a:r>
             <a:endParaRPr lang="en-SG" sz="1600" dirty="0">
               <a:solidFill>
@@ -5836,7 +5849,7 @@
                   </a:schemeClr>
                 </a:solidFill>
               </a:rPr>
-              <a:t>commitAddressBook</a:t>
+              <a:t>commitSsenisub</a:t>
             </a:r>
             <a:r>
               <a:rPr lang="en-US" sz="1200" dirty="0">
@@ -5846,7 +5859,7 @@
                   </a:schemeClr>
                 </a:solidFill>
               </a:rPr>
-              <a:t>()</a:t>
+              <a:t> ()</a:t>
             </a:r>
             <a:endParaRPr lang="en-US" sz="1200" dirty="0"/>
           </a:p>
@@ -6137,8 +6150,8 @@
         </p:nvCxnSpPr>
         <p:spPr>
           <a:xfrm>
-            <a:off x="6789600" y="5678087"/>
-            <a:ext cx="0" cy="432000"/>
+            <a:off x="6789600" y="5796000"/>
+            <a:ext cx="0" cy="360000"/>
           </a:xfrm>
           <a:prstGeom prst="line">
             <a:avLst/>

</xml_diff>